<commit_message>
Updated slides in regards to feature packs + minor other fixes
</commit_message>
<xml_diff>
--- a/Slides/Module 0 - Start.pptx
+++ b/Slides/Module 0 - Start.pptx
@@ -6,23 +6,24 @@
     <p:sldMasterId id="2147483902" r:id="rId3"/>
   </p:sldMasterIdLst>
   <p:notesMasterIdLst>
-    <p:notesMasterId r:id="rId15"/>
+    <p:notesMasterId r:id="rId16"/>
   </p:notesMasterIdLst>
   <p:handoutMasterIdLst>
-    <p:handoutMasterId r:id="rId16"/>
+    <p:handoutMasterId r:id="rId17"/>
   </p:handoutMasterIdLst>
   <p:sldIdLst>
     <p:sldId id="268" r:id="rId4"/>
-    <p:sldId id="258" r:id="rId5"/>
-    <p:sldId id="261" r:id="rId6"/>
-    <p:sldId id="281" r:id="rId7"/>
-    <p:sldId id="291" r:id="rId8"/>
+    <p:sldId id="261" r:id="rId5"/>
+    <p:sldId id="281" r:id="rId6"/>
+    <p:sldId id="291" r:id="rId7"/>
+    <p:sldId id="293" r:id="rId8"/>
     <p:sldId id="285" r:id="rId9"/>
-    <p:sldId id="262" r:id="rId10"/>
-    <p:sldId id="280" r:id="rId11"/>
-    <p:sldId id="288" r:id="rId12"/>
-    <p:sldId id="282" r:id="rId13"/>
-    <p:sldId id="292" r:id="rId14"/>
+    <p:sldId id="258" r:id="rId10"/>
+    <p:sldId id="262" r:id="rId11"/>
+    <p:sldId id="280" r:id="rId12"/>
+    <p:sldId id="288" r:id="rId13"/>
+    <p:sldId id="282" r:id="rId14"/>
+    <p:sldId id="292" r:id="rId15"/>
   </p:sldIdLst>
   <p:sldSz cx="9144000" cy="6858000" type="screen4x3"/>
   <p:notesSz cx="6858000" cy="9144000"/>
@@ -1327,23 +1328,23 @@
     </dgm:pt>
   </dgm:ptLst>
   <dgm:cxnLst>
+    <dgm:cxn modelId="{89270D02-DC27-4B16-97D4-249177A07CB1}" srcId="{F9EFD34A-A68B-4FE7-A2C7-0C9011C5EFAC}" destId="{24DB8160-3794-4FF9-8F90-8E5D43B3A948}" srcOrd="2" destOrd="0" parTransId="{0AE7B716-DD33-4B94-8FD9-32ED6279EBF4}" sibTransId="{DCA2D213-010C-4C40-8033-48C12EE37E77}"/>
+    <dgm:cxn modelId="{A3323D08-E5F5-4A24-90F2-354C8A2C9D4A}" srcId="{F9EFD34A-A68B-4FE7-A2C7-0C9011C5EFAC}" destId="{A6ACD08F-22A9-43DF-9089-E58B26053E9D}" srcOrd="3" destOrd="0" parTransId="{8CF3C4C4-BC3A-4C33-90E6-90BF140E1A43}" sibTransId="{11617C9A-B8EC-4600-801B-F6EAB43D5236}"/>
+    <dgm:cxn modelId="{4237270A-9AEF-49CE-A058-1A51DB5AE817}" srcId="{ECA7E817-9327-4A7D-B0B1-E9B30F4D8680}" destId="{0AF9CA89-244D-49CA-A015-EEA21517CAC0}" srcOrd="1" destOrd="0" parTransId="{F15ABDF1-FA2C-4EFB-ACCD-F89EBEE3F01C}" sibTransId="{0D6EEF48-548C-4F8D-9CEA-039656D5172E}"/>
+    <dgm:cxn modelId="{03287020-94BA-4E00-AFD6-202F63300B6C}" type="presOf" srcId="{632A9F42-3253-4082-AAAD-D8599D1AD23B}" destId="{A29E0A54-B8F0-40D4-9A27-9DAB10F7A219}" srcOrd="0" destOrd="0" presId="urn:microsoft.com/office/officeart/2005/8/layout/balance1"/>
+    <dgm:cxn modelId="{9797F527-019C-41E6-BA23-E7F683F53BAF}" type="presOf" srcId="{F9EFD34A-A68B-4FE7-A2C7-0C9011C5EFAC}" destId="{32BCFF81-8158-4CB1-9FC1-114503C44B1D}" srcOrd="0" destOrd="0" presId="urn:microsoft.com/office/officeart/2005/8/layout/balance1"/>
+    <dgm:cxn modelId="{D2E6BF34-28DE-4DCC-8894-25A304B91A5B}" type="presOf" srcId="{24DB8160-3794-4FF9-8F90-8E5D43B3A948}" destId="{AF022F79-3E1F-4FE7-9285-8939536EC21F}" srcOrd="0" destOrd="0" presId="urn:microsoft.com/office/officeart/2005/8/layout/balance1"/>
+    <dgm:cxn modelId="{BD2A6C36-E92B-416D-89EB-587FE4F6D5A1}" srcId="{ECA7E817-9327-4A7D-B0B1-E9B30F4D8680}" destId="{632A9F42-3253-4082-AAAD-D8599D1AD23B}" srcOrd="0" destOrd="0" parTransId="{BA1915A3-EF9D-4931-9B2A-9C1292CFCFB2}" sibTransId="{AB537B7C-7439-4D93-A5DC-A4D482D09196}"/>
+    <dgm:cxn modelId="{AC2E6560-3041-4F15-BC47-CED5B6726285}" srcId="{22F3E0D3-2179-40F1-8430-E2123D69EB80}" destId="{ECA7E817-9327-4A7D-B0B1-E9B30F4D8680}" srcOrd="1" destOrd="0" parTransId="{E0A9A326-9823-4005-B101-7B6E2E502AB9}" sibTransId="{D9D45A3F-2F1F-43D6-A6E8-4384E9AA66A8}"/>
+    <dgm:cxn modelId="{70065C7B-BF41-4C01-A53F-3F82F3E86560}" srcId="{F9EFD34A-A68B-4FE7-A2C7-0C9011C5EFAC}" destId="{E21F059F-1625-4CC9-B13A-21F914D131BA}" srcOrd="1" destOrd="0" parTransId="{5F6CFB73-E709-48FA-B665-47ABA1A8FACF}" sibTransId="{4EB066E4-EA04-48B4-922E-2F87D34B2647}"/>
     <dgm:cxn modelId="{E9545B81-6BEE-4CE3-B0AA-F1482314BBB5}" srcId="{22F3E0D3-2179-40F1-8430-E2123D69EB80}" destId="{F9EFD34A-A68B-4FE7-A2C7-0C9011C5EFAC}" srcOrd="0" destOrd="0" parTransId="{51FDBC62-DF67-4D6A-8E51-DDFC47E9EA92}" sibTransId="{ECD7308E-74A3-4CF9-9FD1-A7397900AFDC}"/>
-    <dgm:cxn modelId="{4237270A-9AEF-49CE-A058-1A51DB5AE817}" srcId="{ECA7E817-9327-4A7D-B0B1-E9B30F4D8680}" destId="{0AF9CA89-244D-49CA-A015-EEA21517CAC0}" srcOrd="1" destOrd="0" parTransId="{F15ABDF1-FA2C-4EFB-ACCD-F89EBEE3F01C}" sibTransId="{0D6EEF48-548C-4F8D-9CEA-039656D5172E}"/>
+    <dgm:cxn modelId="{3DE48A93-ADED-46D6-A0F4-F4E3B4FEAC6A}" type="presOf" srcId="{ECA7E817-9327-4A7D-B0B1-E9B30F4D8680}" destId="{672347AB-0B9C-47C4-9A30-FEB7B50F174F}" srcOrd="0" destOrd="0" presId="urn:microsoft.com/office/officeart/2005/8/layout/balance1"/>
+    <dgm:cxn modelId="{0C1E4B9F-4944-4B1C-9FB3-4BFBFFA53655}" srcId="{F9EFD34A-A68B-4FE7-A2C7-0C9011C5EFAC}" destId="{113C50EA-41A3-4852-B54E-F1467077A051}" srcOrd="0" destOrd="0" parTransId="{42C9BA7E-6E9A-4CFA-B278-045FFA0CF197}" sibTransId="{A1A813D3-3F1D-4CA4-AA12-17F2B2E28285}"/>
     <dgm:cxn modelId="{42CE87C8-331E-4EE0-B547-DBB6D4F42877}" type="presOf" srcId="{A6ACD08F-22A9-43DF-9089-E58B26053E9D}" destId="{69822BBA-32BB-4A0C-B6FC-9C742F2D3579}" srcOrd="0" destOrd="0" presId="urn:microsoft.com/office/officeart/2005/8/layout/balance1"/>
-    <dgm:cxn modelId="{70065C7B-BF41-4C01-A53F-3F82F3E86560}" srcId="{F9EFD34A-A68B-4FE7-A2C7-0C9011C5EFAC}" destId="{E21F059F-1625-4CC9-B13A-21F914D131BA}" srcOrd="1" destOrd="0" parTransId="{5F6CFB73-E709-48FA-B665-47ABA1A8FACF}" sibTransId="{4EB066E4-EA04-48B4-922E-2F87D34B2647}"/>
     <dgm:cxn modelId="{C27B7ACA-7A49-43C5-91CA-DFC38683708E}" type="presOf" srcId="{113C50EA-41A3-4852-B54E-F1467077A051}" destId="{234A62B1-3B45-4D08-8A97-3039CCA1ABCF}" srcOrd="0" destOrd="0" presId="urn:microsoft.com/office/officeart/2005/8/layout/balance1"/>
-    <dgm:cxn modelId="{9797F527-019C-41E6-BA23-E7F683F53BAF}" type="presOf" srcId="{F9EFD34A-A68B-4FE7-A2C7-0C9011C5EFAC}" destId="{32BCFF81-8158-4CB1-9FC1-114503C44B1D}" srcOrd="0" destOrd="0" presId="urn:microsoft.com/office/officeart/2005/8/layout/balance1"/>
+    <dgm:cxn modelId="{BED365DE-BDC8-4A3F-9770-9B7B3412CD54}" type="presOf" srcId="{E21F059F-1625-4CC9-B13A-21F914D131BA}" destId="{7517E3E7-FB6F-4436-B103-05272AAB5767}" srcOrd="0" destOrd="0" presId="urn:microsoft.com/office/officeart/2005/8/layout/balance1"/>
     <dgm:cxn modelId="{7768B7EC-783C-4190-A49C-0DE21C0C16AE}" type="presOf" srcId="{0AF9CA89-244D-49CA-A015-EEA21517CAC0}" destId="{DD8E9812-0939-4877-AA6F-9DC2485435FD}" srcOrd="0" destOrd="0" presId="urn:microsoft.com/office/officeart/2005/8/layout/balance1"/>
-    <dgm:cxn modelId="{89270D02-DC27-4B16-97D4-249177A07CB1}" srcId="{F9EFD34A-A68B-4FE7-A2C7-0C9011C5EFAC}" destId="{24DB8160-3794-4FF9-8F90-8E5D43B3A948}" srcOrd="2" destOrd="0" parTransId="{0AE7B716-DD33-4B94-8FD9-32ED6279EBF4}" sibTransId="{DCA2D213-010C-4C40-8033-48C12EE37E77}"/>
     <dgm:cxn modelId="{4DB12CED-936A-4755-87F3-DEF6DF600C90}" type="presOf" srcId="{22F3E0D3-2179-40F1-8430-E2123D69EB80}" destId="{BBD2CC97-7E1A-408D-88CB-75A9EDB36DD1}" srcOrd="0" destOrd="0" presId="urn:microsoft.com/office/officeart/2005/8/layout/balance1"/>
-    <dgm:cxn modelId="{D2E6BF34-28DE-4DCC-8894-25A304B91A5B}" type="presOf" srcId="{24DB8160-3794-4FF9-8F90-8E5D43B3A948}" destId="{AF022F79-3E1F-4FE7-9285-8939536EC21F}" srcOrd="0" destOrd="0" presId="urn:microsoft.com/office/officeart/2005/8/layout/balance1"/>
-    <dgm:cxn modelId="{A3323D08-E5F5-4A24-90F2-354C8A2C9D4A}" srcId="{F9EFD34A-A68B-4FE7-A2C7-0C9011C5EFAC}" destId="{A6ACD08F-22A9-43DF-9089-E58B26053E9D}" srcOrd="3" destOrd="0" parTransId="{8CF3C4C4-BC3A-4C33-90E6-90BF140E1A43}" sibTransId="{11617C9A-B8EC-4600-801B-F6EAB43D5236}"/>
-    <dgm:cxn modelId="{03287020-94BA-4E00-AFD6-202F63300B6C}" type="presOf" srcId="{632A9F42-3253-4082-AAAD-D8599D1AD23B}" destId="{A29E0A54-B8F0-40D4-9A27-9DAB10F7A219}" srcOrd="0" destOrd="0" presId="urn:microsoft.com/office/officeart/2005/8/layout/balance1"/>
-    <dgm:cxn modelId="{BED365DE-BDC8-4A3F-9770-9B7B3412CD54}" type="presOf" srcId="{E21F059F-1625-4CC9-B13A-21F914D131BA}" destId="{7517E3E7-FB6F-4436-B103-05272AAB5767}" srcOrd="0" destOrd="0" presId="urn:microsoft.com/office/officeart/2005/8/layout/balance1"/>
-    <dgm:cxn modelId="{0C1E4B9F-4944-4B1C-9FB3-4BFBFFA53655}" srcId="{F9EFD34A-A68B-4FE7-A2C7-0C9011C5EFAC}" destId="{113C50EA-41A3-4852-B54E-F1467077A051}" srcOrd="0" destOrd="0" parTransId="{42C9BA7E-6E9A-4CFA-B278-045FFA0CF197}" sibTransId="{A1A813D3-3F1D-4CA4-AA12-17F2B2E28285}"/>
-    <dgm:cxn modelId="{AC2E6560-3041-4F15-BC47-CED5B6726285}" srcId="{22F3E0D3-2179-40F1-8430-E2123D69EB80}" destId="{ECA7E817-9327-4A7D-B0B1-E9B30F4D8680}" srcOrd="1" destOrd="0" parTransId="{E0A9A326-9823-4005-B101-7B6E2E502AB9}" sibTransId="{D9D45A3F-2F1F-43D6-A6E8-4384E9AA66A8}"/>
-    <dgm:cxn modelId="{3DE48A93-ADED-46D6-A0F4-F4E3B4FEAC6A}" type="presOf" srcId="{ECA7E817-9327-4A7D-B0B1-E9B30F4D8680}" destId="{672347AB-0B9C-47C4-9A30-FEB7B50F174F}" srcOrd="0" destOrd="0" presId="urn:microsoft.com/office/officeart/2005/8/layout/balance1"/>
-    <dgm:cxn modelId="{BD2A6C36-E92B-416D-89EB-587FE4F6D5A1}" srcId="{ECA7E817-9327-4A7D-B0B1-E9B30F4D8680}" destId="{632A9F42-3253-4082-AAAD-D8599D1AD23B}" srcOrd="0" destOrd="0" parTransId="{BA1915A3-EF9D-4931-9B2A-9C1292CFCFB2}" sibTransId="{AB537B7C-7439-4D93-A5DC-A4D482D09196}"/>
     <dgm:cxn modelId="{298FDF66-9ED1-4843-A7C2-E61CFDCDCEDB}" type="presParOf" srcId="{BBD2CC97-7E1A-408D-88CB-75A9EDB36DD1}" destId="{492C6660-D66E-4000-ACE8-3F97F3CAAF40}" srcOrd="0" destOrd="0" presId="urn:microsoft.com/office/officeart/2005/8/layout/balance1"/>
     <dgm:cxn modelId="{D65AD182-BD66-4071-B247-FA277C07D957}" type="presParOf" srcId="{BBD2CC97-7E1A-408D-88CB-75A9EDB36DD1}" destId="{80BCB28C-518B-4684-8E4C-B7DDCFFB48F6}" srcOrd="1" destOrd="0" presId="urn:microsoft.com/office/officeart/2005/8/layout/balance1"/>
     <dgm:cxn modelId="{F470832A-D7B0-4C16-8BF6-DB725B6B9CEC}" type="presParOf" srcId="{80BCB28C-518B-4684-8E4C-B7DDCFFB48F6}" destId="{32BCFF81-8158-4CB1-9FC1-114503C44B1D}" srcOrd="0" destOrd="0" presId="urn:microsoft.com/office/officeart/2005/8/layout/balance1"/>
@@ -6871,7 +6872,7 @@
               <a:pPr>
                 <a:defRPr/>
               </a:pPr>
-              <a:t>16 January 2017</a:t>
+              <a:t>07 October 2018</a:t>
             </a:fld>
             <a:endParaRPr lang="de-DE"/>
           </a:p>
@@ -7182,7 +7183,7 @@
               <a:pPr>
                 <a:defRPr/>
               </a:pPr>
-              <a:t>16. Januar 2017</a:t>
+              <a:t>7. Oktober 2018</a:t>
             </a:fld>
             <a:r>
               <a:rPr lang="de-DE"/>
@@ -7476,7 +7477,7 @@
               <a:pPr>
                 <a:defRPr/>
               </a:pPr>
-              <a:t>16. Januar 2017</a:t>
+              <a:t>7. Oktober 2018</a:t>
             </a:fld>
             <a:r>
               <a:rPr lang="de-DE"/>
@@ -8131,7 +8132,7 @@
                   <a:schemeClr val="bg2"/>
                 </a:buClr>
               </a:pPr>
-              <a:t>3</a:t>
+              <a:t>2</a:t>
             </a:fld>
             <a:endParaRPr lang="en-US" sz="1200"/>
           </a:p>
@@ -8290,7 +8291,7 @@
               <a:pPr>
                 <a:defRPr/>
               </a:pPr>
-              <a:t>16. Januar 2017</a:t>
+              <a:t>7. Oktober 2018</a:t>
             </a:fld>
             <a:r>
               <a:rPr lang="de-DE"/>
@@ -8322,7 +8323,7 @@
               <a:pPr>
                 <a:defRPr/>
               </a:pPr>
-              <a:t>5</a:t>
+              <a:t>4</a:t>
             </a:fld>
             <a:endParaRPr lang="de-DE"/>
           </a:p>
@@ -8412,7 +8413,7 @@
               <a:pPr>
                 <a:defRPr/>
               </a:pPr>
-              <a:t>16. Januar 2017</a:t>
+              <a:t>7. Oktober 2018</a:t>
             </a:fld>
             <a:r>
               <a:rPr lang="de-DE"/>
@@ -9032,7 +9033,7 @@
                   <a:schemeClr val="bg2"/>
                 </a:buClr>
               </a:pPr>
-              <a:t>7</a:t>
+              <a:t>8</a:t>
             </a:fld>
             <a:endParaRPr lang="en-US" sz="1200"/>
           </a:p>
@@ -9137,7 +9138,7 @@
             <a:fld id="{9DE7534A-5CC6-4C1E-8BEE-4B67478EA4F3}" type="slidenum">
               <a:rPr lang="en-US"/>
               <a:pPr/>
-              <a:t>10</a:t>
+              <a:t>11</a:t>
             </a:fld>
             <a:endParaRPr lang="en-US"/>
           </a:p>
@@ -9321,7 +9322,7 @@
           <a:p>
             <a:fld id="{243B3B10-B9A1-4966-B5AA-413205F2DE37}" type="datetimeFigureOut">
               <a:rPr lang="en-US" smtClean="0"/>
-              <a:t>1/16/2017</a:t>
+              <a:t>10/7/2018</a:t>
             </a:fld>
             <a:endParaRPr lang="en-US"/>
           </a:p>
@@ -9489,7 +9490,7 @@
           <a:p>
             <a:fld id="{243B3B10-B9A1-4966-B5AA-413205F2DE37}" type="datetimeFigureOut">
               <a:rPr lang="en-US" smtClean="0"/>
-              <a:t>1/16/2017</a:t>
+              <a:t>10/7/2018</a:t>
             </a:fld>
             <a:endParaRPr lang="en-US"/>
           </a:p>
@@ -9667,7 +9668,7 @@
           <a:p>
             <a:fld id="{243B3B10-B9A1-4966-B5AA-413205F2DE37}" type="datetimeFigureOut">
               <a:rPr lang="en-US" smtClean="0"/>
-              <a:t>1/16/2017</a:t>
+              <a:t>10/7/2018</a:t>
             </a:fld>
             <a:endParaRPr lang="en-US"/>
           </a:p>
@@ -11111,7 +11112,7 @@
           <a:p>
             <a:fld id="{243B3B10-B9A1-4966-B5AA-413205F2DE37}" type="datetimeFigureOut">
               <a:rPr lang="en-US" smtClean="0"/>
-              <a:t>1/16/2017</a:t>
+              <a:t>10/7/2018</a:t>
             </a:fld>
             <a:endParaRPr lang="en-US"/>
           </a:p>
@@ -12412,7 +12413,7 @@
           <a:p>
             <a:fld id="{243B3B10-B9A1-4966-B5AA-413205F2DE37}" type="datetimeFigureOut">
               <a:rPr lang="en-US" smtClean="0"/>
-              <a:t>1/16/2017</a:t>
+              <a:t>10/7/2018</a:t>
             </a:fld>
             <a:endParaRPr lang="en-US"/>
           </a:p>
@@ -12641,7 +12642,7 @@
           <a:p>
             <a:fld id="{243B3B10-B9A1-4966-B5AA-413205F2DE37}" type="datetimeFigureOut">
               <a:rPr lang="en-US" smtClean="0"/>
-              <a:t>1/16/2017</a:t>
+              <a:t>10/7/2018</a:t>
             </a:fld>
             <a:endParaRPr lang="en-US"/>
           </a:p>
@@ -13005,7 +13006,7 @@
           <a:p>
             <a:fld id="{243B3B10-B9A1-4966-B5AA-413205F2DE37}" type="datetimeFigureOut">
               <a:rPr lang="en-US" smtClean="0"/>
-              <a:t>1/16/2017</a:t>
+              <a:t>10/7/2018</a:t>
             </a:fld>
             <a:endParaRPr lang="en-US"/>
           </a:p>
@@ -13122,7 +13123,7 @@
           <a:p>
             <a:fld id="{243B3B10-B9A1-4966-B5AA-413205F2DE37}" type="datetimeFigureOut">
               <a:rPr lang="en-US" smtClean="0"/>
-              <a:t>1/16/2017</a:t>
+              <a:t>10/7/2018</a:t>
             </a:fld>
             <a:endParaRPr lang="en-US"/>
           </a:p>
@@ -13217,7 +13218,7 @@
           <a:p>
             <a:fld id="{243B3B10-B9A1-4966-B5AA-413205F2DE37}" type="datetimeFigureOut">
               <a:rPr lang="en-US" smtClean="0"/>
-              <a:t>1/16/2017</a:t>
+              <a:t>10/7/2018</a:t>
             </a:fld>
             <a:endParaRPr lang="en-US"/>
           </a:p>
@@ -13492,7 +13493,7 @@
           <a:p>
             <a:fld id="{243B3B10-B9A1-4966-B5AA-413205F2DE37}" type="datetimeFigureOut">
               <a:rPr lang="en-US" smtClean="0"/>
-              <a:t>1/16/2017</a:t>
+              <a:t>10/7/2018</a:t>
             </a:fld>
             <a:endParaRPr lang="en-US"/>
           </a:p>
@@ -13744,7 +13745,7 @@
           <a:p>
             <a:fld id="{243B3B10-B9A1-4966-B5AA-413205F2DE37}" type="datetimeFigureOut">
               <a:rPr lang="en-US" smtClean="0"/>
-              <a:t>1/16/2017</a:t>
+              <a:t>10/7/2018</a:t>
             </a:fld>
             <a:endParaRPr lang="en-US"/>
           </a:p>
@@ -13955,7 +13956,7 @@
           <a:p>
             <a:fld id="{243B3B10-B9A1-4966-B5AA-413205F2DE37}" type="datetimeFigureOut">
               <a:rPr lang="en-US" smtClean="0"/>
-              <a:t>1/16/2017</a:t>
+              <a:t>10/7/2018</a:t>
             </a:fld>
             <a:endParaRPr lang="en-US"/>
           </a:p>
@@ -15042,6 +15043,111 @@
       </p:grpSpPr>
       <p:sp>
         <p:nvSpPr>
+          <p:cNvPr id="734210" name="Rectangle 2"/>
+          <p:cNvSpPr>
+            <a:spLocks noGrp="1" noChangeArrowheads="1"/>
+          </p:cNvSpPr>
+          <p:nvPr>
+            <p:ph type="title"/>
+          </p:nvPr>
+        </p:nvSpPr>
+        <p:spPr/>
+        <p:txBody>
+          <a:bodyPr/>
+          <a:lstStyle/>
+          <a:p>
+            <a:r>
+              <a:rPr lang="en-US" dirty="0"/>
+              <a:t>Lab Machine Environment</a:t>
+            </a:r>
+          </a:p>
+        </p:txBody>
+      </p:sp>
+      <p:sp>
+        <p:nvSpPr>
+          <p:cNvPr id="734211" name="Rectangle 3"/>
+          <p:cNvSpPr>
+            <a:spLocks noGrp="1" noChangeArrowheads="1"/>
+          </p:cNvSpPr>
+          <p:nvPr>
+            <p:ph idx="1"/>
+          </p:nvPr>
+        </p:nvSpPr>
+        <p:spPr/>
+        <p:txBody>
+          <a:bodyPr/>
+          <a:lstStyle/>
+          <a:p>
+            <a:r>
+              <a:rPr lang="en-US" dirty="0"/>
+              <a:t>Microsoft Windows Server 2016</a:t>
+            </a:r>
+          </a:p>
+          <a:p>
+            <a:r>
+              <a:rPr lang="en-US" dirty="0"/>
+              <a:t>Microsoft Visual Studio 2015</a:t>
+            </a:r>
+          </a:p>
+          <a:p>
+            <a:r>
+              <a:rPr lang="en-US" dirty="0"/>
+              <a:t>Microsoft SQL Server 2014</a:t>
+            </a:r>
+          </a:p>
+          <a:p>
+            <a:r>
+              <a:rPr lang="en-US" dirty="0"/>
+              <a:t>Microsoft BizTalk Server 2016</a:t>
+            </a:r>
+          </a:p>
+          <a:p>
+            <a:endParaRPr lang="en-US" dirty="0"/>
+          </a:p>
+          <a:p>
+            <a:r>
+              <a:rPr lang="en-US" dirty="0"/>
+              <a:t>Microsoft Office 2016</a:t>
+            </a:r>
+          </a:p>
+          <a:p>
+            <a:pPr lvl="1"/>
+            <a:endParaRPr lang="en-US" dirty="0"/>
+          </a:p>
+        </p:txBody>
+      </p:sp>
+    </p:spTree>
+    <p:extLst>
+      <p:ext uri="{BB962C8B-B14F-4D97-AF65-F5344CB8AC3E}">
+        <p14:creationId xmlns:p14="http://schemas.microsoft.com/office/powerpoint/2010/main" val="2586279579"/>
+      </p:ext>
+    </p:extLst>
+  </p:cSld>
+  <p:clrMapOvr>
+    <a:masterClrMapping/>
+  </p:clrMapOvr>
+</p:sld>
+</file>
+
+<file path=ppt/slides/slide11.xml><?xml version="1.0" encoding="utf-8"?>
+<p:sld xmlns:a="http://schemas.openxmlformats.org/drawingml/2006/main" xmlns:r="http://schemas.openxmlformats.org/officeDocument/2006/relationships" xmlns:p="http://schemas.openxmlformats.org/presentationml/2006/main">
+  <p:cSld>
+    <p:spTree>
+      <p:nvGrpSpPr>
+        <p:cNvPr id="1" name=""/>
+        <p:cNvGrpSpPr/>
+        <p:nvPr/>
+      </p:nvGrpSpPr>
+      <p:grpSpPr>
+        <a:xfrm>
+          <a:off x="0" y="0"/>
+          <a:ext cx="0" cy="0"/>
+          <a:chOff x="0" y="0"/>
+          <a:chExt cx="0" cy="0"/>
+        </a:xfrm>
+      </p:grpSpPr>
+      <p:sp>
+        <p:nvSpPr>
           <p:cNvPr id="700418" name="Rectangle 2"/>
           <p:cNvSpPr>
             <a:spLocks noChangeArrowheads="1"/>
@@ -15223,7 +15329,7 @@
 </p:sld>
 </file>
 
-<file path=ppt/slides/slide11.xml><?xml version="1.0" encoding="utf-8"?>
+<file path=ppt/slides/slide12.xml><?xml version="1.0" encoding="utf-8"?>
 <p:sld xmlns:a="http://schemas.openxmlformats.org/drawingml/2006/main" xmlns:r="http://schemas.openxmlformats.org/officeDocument/2006/relationships" xmlns:p="http://schemas.openxmlformats.org/presentationml/2006/main">
   <p:cSld>
     <p:spTree>
@@ -15311,7 +15417,7 @@
               <a:buNone/>
             </a:pPr>
             <a:r>
-              <a:rPr lang="en-US" sz="2800" b="1" dirty="0">
+              <a:rPr lang="en-US" sz="2400" b="1" dirty="0">
                 <a:solidFill>
                   <a:schemeClr val="bg1">
                     <a:lumMod val="50000"/>
@@ -15319,20 +15425,15 @@
                 </a:solidFill>
                 <a:latin typeface="Consolas" panose="020B0609020204030204" pitchFamily="49" charset="0"/>
               </a:rPr>
-              <a:t>https://bit.ly/</a:t>
-            </a:r>
-            <a:r>
-              <a:rPr lang="en-US" sz="2800" b="1" dirty="0">
+              <a:t>http://bit.ly/</a:t>
+            </a:r>
+            <a:r>
+              <a:rPr lang="en-US" sz="2400" b="1" dirty="0">
                 <a:latin typeface="Consolas" panose="020B0609020204030204" pitchFamily="49" charset="0"/>
               </a:rPr>
-              <a:t>IntroductionToBizTalk</a:t>
-            </a:r>
-          </a:p>
-          <a:p>
-            <a:pPr marL="0" indent="0">
-              <a:buNone/>
-            </a:pPr>
-            <a:endParaRPr lang="sv-SE" sz="2800" b="1" dirty="0">
+              <a:t>DevelopingIntegrationSolutions</a:t>
+            </a:r>
+            <a:endParaRPr lang="sv-SE" sz="2400" b="1" dirty="0">
               <a:latin typeface="Consolas" panose="020B0609020204030204" pitchFamily="49" charset="0"/>
             </a:endParaRPr>
           </a:p>
@@ -15371,130 +15472,6 @@
 </file>
 
 <file path=ppt/slides/slide2.xml><?xml version="1.0" encoding="utf-8"?>
-<p:sld xmlns:a="http://schemas.openxmlformats.org/drawingml/2006/main" xmlns:r="http://schemas.openxmlformats.org/officeDocument/2006/relationships" xmlns:p="http://schemas.openxmlformats.org/presentationml/2006/main">
-  <p:cSld>
-    <p:spTree>
-      <p:nvGrpSpPr>
-        <p:cNvPr id="1" name=""/>
-        <p:cNvGrpSpPr/>
-        <p:nvPr/>
-      </p:nvGrpSpPr>
-      <p:grpSpPr>
-        <a:xfrm>
-          <a:off x="0" y="0"/>
-          <a:ext cx="0" cy="0"/>
-          <a:chOff x="0" y="0"/>
-          <a:chExt cx="0" cy="0"/>
-        </a:xfrm>
-      </p:grpSpPr>
-      <p:sp>
-        <p:nvSpPr>
-          <p:cNvPr id="12290" name="Rubrik 1"/>
-          <p:cNvSpPr>
-            <a:spLocks noGrp="1"/>
-          </p:cNvSpPr>
-          <p:nvPr>
-            <p:ph type="title"/>
-          </p:nvPr>
-        </p:nvSpPr>
-        <p:spPr>
-          <a:extLst>
-            <a:ext uri="{53640926-AAD7-44D8-BBD7-CCE9431645EC}">
-              <a14:shadowObscured xmlns:a14="http://schemas.microsoft.com/office/drawing/2010/main" val="1"/>
-            </a:ext>
-          </a:extLst>
-        </p:spPr>
-        <p:txBody>
-          <a:bodyPr/>
-          <a:lstStyle/>
-          <a:p>
-            <a:pPr eaLnBrk="1" hangingPunct="1"/>
-            <a:r>
-              <a:rPr lang="en-GB" dirty="0"/>
-              <a:t>Introduction</a:t>
-            </a:r>
-          </a:p>
-        </p:txBody>
-      </p:sp>
-      <p:sp>
-        <p:nvSpPr>
-          <p:cNvPr id="12291" name="Platshållare för innehåll 2"/>
-          <p:cNvSpPr>
-            <a:spLocks noGrp="1"/>
-          </p:cNvSpPr>
-          <p:nvPr>
-            <p:ph idx="1"/>
-          </p:nvPr>
-        </p:nvSpPr>
-        <p:spPr/>
-        <p:txBody>
-          <a:bodyPr/>
-          <a:lstStyle/>
-          <a:p>
-            <a:pPr eaLnBrk="1" hangingPunct="1"/>
-            <a:r>
-              <a:rPr lang="en-GB" dirty="0"/>
-              <a:t>Name</a:t>
-            </a:r>
-          </a:p>
-          <a:p>
-            <a:pPr eaLnBrk="1" hangingPunct="1"/>
-            <a:r>
-              <a:rPr lang="en-GB" dirty="0"/>
-              <a:t>Company</a:t>
-            </a:r>
-          </a:p>
-          <a:p>
-            <a:pPr eaLnBrk="1" hangingPunct="1"/>
-            <a:r>
-              <a:rPr lang="en-GB" dirty="0"/>
-              <a:t>Title, role, job function or responsibility</a:t>
-            </a:r>
-          </a:p>
-          <a:p>
-            <a:pPr eaLnBrk="1" hangingPunct="1"/>
-            <a:r>
-              <a:rPr lang="en-GB" dirty="0"/>
-              <a:t>Experience</a:t>
-            </a:r>
-          </a:p>
-          <a:p>
-            <a:pPr lvl="1"/>
-            <a:r>
-              <a:rPr lang="en-GB" dirty="0"/>
-              <a:t>Programming</a:t>
-            </a:r>
-          </a:p>
-          <a:p>
-            <a:pPr lvl="1"/>
-            <a:r>
-              <a:rPr lang="en-GB" dirty="0"/>
-              <a:t>Integration platforms</a:t>
-            </a:r>
-          </a:p>
-          <a:p>
-            <a:r>
-              <a:rPr lang="en-GB" dirty="0"/>
-              <a:t>Favourite utility or tool</a:t>
-            </a:r>
-          </a:p>
-          <a:p>
-            <a:r>
-              <a:rPr lang="en-GB" dirty="0"/>
-              <a:t>Expectations on this course</a:t>
-            </a:r>
-          </a:p>
-        </p:txBody>
-      </p:sp>
-    </p:spTree>
-  </p:cSld>
-  <p:clrMapOvr>
-    <a:masterClrMapping/>
-  </p:clrMapOvr>
-</p:sld>
-</file>
-
-<file path=ppt/slides/slide3.xml><?xml version="1.0" encoding="utf-8"?>
 <p:sld xmlns:a="http://schemas.openxmlformats.org/drawingml/2006/main" xmlns:r="http://schemas.openxmlformats.org/officeDocument/2006/relationships" xmlns:p="http://schemas.openxmlformats.org/presentationml/2006/main">
   <p:cSld>
     <p:spTree>
@@ -16252,7 +16229,7 @@
 </p:sld>
 </file>
 
-<file path=ppt/slides/slide4.xml><?xml version="1.0" encoding="utf-8"?>
+<file path=ppt/slides/slide3.xml><?xml version="1.0" encoding="utf-8"?>
 <p:sld xmlns:a="http://schemas.openxmlformats.org/drawingml/2006/main" xmlns:r="http://schemas.openxmlformats.org/officeDocument/2006/relationships" xmlns:p="http://schemas.openxmlformats.org/presentationml/2006/main">
   <p:cSld>
     <p:spTree>
@@ -16326,7 +16303,7 @@
 </p:sld>
 </file>
 
-<file path=ppt/slides/slide5.xml><?xml version="1.0" encoding="utf-8"?>
+<file path=ppt/slides/slide4.xml><?xml version="1.0" encoding="utf-8"?>
 <p:sld xmlns:a="http://schemas.openxmlformats.org/drawingml/2006/main" xmlns:r="http://schemas.openxmlformats.org/officeDocument/2006/relationships" xmlns:p="http://schemas.openxmlformats.org/presentationml/2006/main">
   <p:cSld>
     <p:spTree>
@@ -17247,6 +17224,150 @@
 </p:sld>
 </file>
 
+<file path=ppt/slides/slide5.xml><?xml version="1.0" encoding="utf-8"?>
+<p:sld xmlns:a="http://schemas.openxmlformats.org/drawingml/2006/main" xmlns:r="http://schemas.openxmlformats.org/officeDocument/2006/relationships" xmlns:p="http://schemas.openxmlformats.org/presentationml/2006/main">
+  <p:cSld>
+    <p:spTree>
+      <p:nvGrpSpPr>
+        <p:cNvPr id="1" name=""/>
+        <p:cNvGrpSpPr/>
+        <p:nvPr/>
+      </p:nvGrpSpPr>
+      <p:grpSpPr>
+        <a:xfrm>
+          <a:off x="0" y="0"/>
+          <a:ext cx="0" cy="0"/>
+          <a:chOff x="0" y="0"/>
+          <a:chExt cx="0" cy="0"/>
+        </a:xfrm>
+      </p:grpSpPr>
+      <p:sp>
+        <p:nvSpPr>
+          <p:cNvPr id="2" name="Title 1">
+            <a:extLst>
+              <a:ext uri="{FF2B5EF4-FFF2-40B4-BE49-F238E27FC236}">
+                <a16:creationId xmlns:a16="http://schemas.microsoft.com/office/drawing/2014/main" id="{8290C1D2-39A5-45F9-8DE5-7A5AB4F46CC7}"/>
+              </a:ext>
+            </a:extLst>
+          </p:cNvPr>
+          <p:cNvSpPr>
+            <a:spLocks noGrp="1"/>
+          </p:cNvSpPr>
+          <p:nvPr>
+            <p:ph type="title"/>
+          </p:nvPr>
+        </p:nvSpPr>
+        <p:spPr/>
+        <p:txBody>
+          <a:bodyPr/>
+          <a:lstStyle/>
+          <a:p>
+            <a:r>
+              <a:rPr lang="en-US" dirty="0"/>
+              <a:t>Optional content</a:t>
+            </a:r>
+          </a:p>
+        </p:txBody>
+      </p:sp>
+      <p:sp>
+        <p:nvSpPr>
+          <p:cNvPr id="3" name="Content Placeholder 2">
+            <a:extLst>
+              <a:ext uri="{FF2B5EF4-FFF2-40B4-BE49-F238E27FC236}">
+                <a16:creationId xmlns:a16="http://schemas.microsoft.com/office/drawing/2014/main" id="{38692787-09B8-4220-8689-A680390DC676}"/>
+              </a:ext>
+            </a:extLst>
+          </p:cNvPr>
+          <p:cNvSpPr>
+            <a:spLocks noGrp="1"/>
+          </p:cNvSpPr>
+          <p:nvPr>
+            <p:ph idx="1"/>
+          </p:nvPr>
+        </p:nvSpPr>
+        <p:spPr/>
+        <p:txBody>
+          <a:bodyPr/>
+          <a:lstStyle/>
+          <a:p>
+            <a:r>
+              <a:rPr lang="en-US" dirty="0"/>
+              <a:t>This course tries to embrace the fact that everyone does not:</a:t>
+            </a:r>
+          </a:p>
+          <a:p>
+            <a:pPr lvl="1"/>
+            <a:r>
+              <a:rPr lang="en-US" dirty="0"/>
+              <a:t>have the same experience</a:t>
+            </a:r>
+          </a:p>
+          <a:p>
+            <a:pPr lvl="1"/>
+            <a:r>
+              <a:rPr lang="en-US" dirty="0"/>
+              <a:t>learn the same way</a:t>
+            </a:r>
+          </a:p>
+          <a:p>
+            <a:pPr lvl="1"/>
+            <a:r>
+              <a:rPr lang="en-US" dirty="0"/>
+              <a:t>read instructions at the same speed</a:t>
+            </a:r>
+          </a:p>
+          <a:p>
+            <a:pPr lvl="1"/>
+            <a:r>
+              <a:rPr lang="en-US" dirty="0"/>
+              <a:t>type or click and point at the same speed</a:t>
+            </a:r>
+          </a:p>
+        </p:txBody>
+      </p:sp>
+      <p:pic>
+        <p:nvPicPr>
+          <p:cNvPr id="4" name="Picture 3">
+            <a:extLst>
+              <a:ext uri="{FF2B5EF4-FFF2-40B4-BE49-F238E27FC236}">
+                <a16:creationId xmlns:a16="http://schemas.microsoft.com/office/drawing/2014/main" id="{5124F6B2-5BF3-415E-86AE-3350F13701C5}"/>
+              </a:ext>
+            </a:extLst>
+          </p:cNvPr>
+          <p:cNvPicPr>
+            <a:picLocks noChangeAspect="1"/>
+          </p:cNvPicPr>
+          <p:nvPr/>
+        </p:nvPicPr>
+        <p:blipFill>
+          <a:blip r:embed="rId2"/>
+          <a:stretch>
+            <a:fillRect/>
+          </a:stretch>
+        </p:blipFill>
+        <p:spPr>
+          <a:xfrm>
+            <a:off x="683568" y="3383519"/>
+            <a:ext cx="7867650" cy="1590675"/>
+          </a:xfrm>
+          <a:prstGeom prst="rect">
+            <a:avLst/>
+          </a:prstGeom>
+        </p:spPr>
+      </p:pic>
+    </p:spTree>
+    <p:extLst>
+      <p:ext uri="{BB962C8B-B14F-4D97-AF65-F5344CB8AC3E}">
+        <p14:creationId xmlns:p14="http://schemas.microsoft.com/office/powerpoint/2010/main" val="3414437510"/>
+      </p:ext>
+    </p:extLst>
+  </p:cSld>
+  <p:clrMapOvr>
+    <a:masterClrMapping/>
+  </p:clrMapOvr>
+</p:sld>
+</file>
+
 <file path=ppt/slides/slide6.xml><?xml version="1.0" encoding="utf-8"?>
 <p:sld xmlns:a="http://schemas.openxmlformats.org/drawingml/2006/main" xmlns:r="http://schemas.openxmlformats.org/officeDocument/2006/relationships" xmlns:p="http://schemas.openxmlformats.org/presentationml/2006/main">
   <p:cSld>
@@ -17364,6 +17485,130 @@
 </file>
 
 <file path=ppt/slides/slide7.xml><?xml version="1.0" encoding="utf-8"?>
+<p:sld xmlns:a="http://schemas.openxmlformats.org/drawingml/2006/main" xmlns:r="http://schemas.openxmlformats.org/officeDocument/2006/relationships" xmlns:p="http://schemas.openxmlformats.org/presentationml/2006/main">
+  <p:cSld>
+    <p:spTree>
+      <p:nvGrpSpPr>
+        <p:cNvPr id="1" name=""/>
+        <p:cNvGrpSpPr/>
+        <p:nvPr/>
+      </p:nvGrpSpPr>
+      <p:grpSpPr>
+        <a:xfrm>
+          <a:off x="0" y="0"/>
+          <a:ext cx="0" cy="0"/>
+          <a:chOff x="0" y="0"/>
+          <a:chExt cx="0" cy="0"/>
+        </a:xfrm>
+      </p:grpSpPr>
+      <p:sp>
+        <p:nvSpPr>
+          <p:cNvPr id="12290" name="Rubrik 1"/>
+          <p:cNvSpPr>
+            <a:spLocks noGrp="1"/>
+          </p:cNvSpPr>
+          <p:nvPr>
+            <p:ph type="title"/>
+          </p:nvPr>
+        </p:nvSpPr>
+        <p:spPr>
+          <a:extLst>
+            <a:ext uri="{53640926-AAD7-44D8-BBD7-CCE9431645EC}">
+              <a14:shadowObscured xmlns:a14="http://schemas.microsoft.com/office/drawing/2010/main" val="1"/>
+            </a:ext>
+          </a:extLst>
+        </p:spPr>
+        <p:txBody>
+          <a:bodyPr/>
+          <a:lstStyle/>
+          <a:p>
+            <a:pPr eaLnBrk="1" hangingPunct="1"/>
+            <a:r>
+              <a:rPr lang="en-GB" dirty="0"/>
+              <a:t>Introduction / who are you?</a:t>
+            </a:r>
+          </a:p>
+        </p:txBody>
+      </p:sp>
+      <p:sp>
+        <p:nvSpPr>
+          <p:cNvPr id="12291" name="Platshållare för innehåll 2"/>
+          <p:cNvSpPr>
+            <a:spLocks noGrp="1"/>
+          </p:cNvSpPr>
+          <p:nvPr>
+            <p:ph idx="1"/>
+          </p:nvPr>
+        </p:nvSpPr>
+        <p:spPr/>
+        <p:txBody>
+          <a:bodyPr/>
+          <a:lstStyle/>
+          <a:p>
+            <a:pPr eaLnBrk="1" hangingPunct="1"/>
+            <a:r>
+              <a:rPr lang="en-GB" dirty="0"/>
+              <a:t>Name</a:t>
+            </a:r>
+          </a:p>
+          <a:p>
+            <a:pPr eaLnBrk="1" hangingPunct="1"/>
+            <a:r>
+              <a:rPr lang="en-GB" dirty="0"/>
+              <a:t>Company</a:t>
+            </a:r>
+          </a:p>
+          <a:p>
+            <a:pPr eaLnBrk="1" hangingPunct="1"/>
+            <a:r>
+              <a:rPr lang="en-GB" dirty="0"/>
+              <a:t>Title, role, job function or responsibility</a:t>
+            </a:r>
+          </a:p>
+          <a:p>
+            <a:pPr eaLnBrk="1" hangingPunct="1"/>
+            <a:r>
+              <a:rPr lang="en-GB" dirty="0"/>
+              <a:t>Experience</a:t>
+            </a:r>
+          </a:p>
+          <a:p>
+            <a:pPr lvl="1"/>
+            <a:r>
+              <a:rPr lang="en-GB" dirty="0"/>
+              <a:t>Programming</a:t>
+            </a:r>
+          </a:p>
+          <a:p>
+            <a:pPr lvl="1"/>
+            <a:r>
+              <a:rPr lang="en-GB" dirty="0"/>
+              <a:t>Integration platforms</a:t>
+            </a:r>
+          </a:p>
+          <a:p>
+            <a:r>
+              <a:rPr lang="en-GB" dirty="0"/>
+              <a:t>Favourite utility or tool</a:t>
+            </a:r>
+          </a:p>
+          <a:p>
+            <a:r>
+              <a:rPr lang="en-GB" dirty="0"/>
+              <a:t>Expectations on this course</a:t>
+            </a:r>
+          </a:p>
+        </p:txBody>
+      </p:sp>
+    </p:spTree>
+  </p:cSld>
+  <p:clrMapOvr>
+    <a:masterClrMapping/>
+  </p:clrMapOvr>
+</p:sld>
+</file>
+
+<file path=ppt/slides/slide8.xml><?xml version="1.0" encoding="utf-8"?>
 <p:sld xmlns:a="http://schemas.openxmlformats.org/drawingml/2006/main" xmlns:r="http://schemas.openxmlformats.org/officeDocument/2006/relationships" xmlns:p="http://schemas.openxmlformats.org/presentationml/2006/main">
   <p:cSld>
     <p:spTree>
@@ -18632,7 +18877,7 @@
             <a:pPr algn="l"/>
             <a:r>
               <a:rPr lang="en-US" sz="1400" dirty="0">
-                <a:hlinkClick r:id=""/>
+                <a:hlinkClick r:id="" action="ppaction://noaction"/>
               </a:rPr>
               <a:t>http://www.microsoft.com/learning/</a:t>
             </a:r>
@@ -18673,7 +18918,7 @@
 </p:sld>
 </file>
 
-<file path=ppt/slides/slide8.xml><?xml version="1.0" encoding="utf-8"?>
+<file path=ppt/slides/slide9.xml><?xml version="1.0" encoding="utf-8"?>
 <p:sld xmlns:a="http://schemas.openxmlformats.org/drawingml/2006/main" xmlns:r="http://schemas.openxmlformats.org/officeDocument/2006/relationships" xmlns:p="http://schemas.openxmlformats.org/presentationml/2006/main">
   <p:cSld>
     <p:spTree>
@@ -18808,111 +19053,6 @@
     <p:extLst>
       <p:ext uri="{BB962C8B-B14F-4D97-AF65-F5344CB8AC3E}">
         <p14:creationId xmlns:p14="http://schemas.microsoft.com/office/powerpoint/2010/main" val="3888832975"/>
-      </p:ext>
-    </p:extLst>
-  </p:cSld>
-  <p:clrMapOvr>
-    <a:masterClrMapping/>
-  </p:clrMapOvr>
-</p:sld>
-</file>
-
-<file path=ppt/slides/slide9.xml><?xml version="1.0" encoding="utf-8"?>
-<p:sld xmlns:a="http://schemas.openxmlformats.org/drawingml/2006/main" xmlns:r="http://schemas.openxmlformats.org/officeDocument/2006/relationships" xmlns:p="http://schemas.openxmlformats.org/presentationml/2006/main">
-  <p:cSld>
-    <p:spTree>
-      <p:nvGrpSpPr>
-        <p:cNvPr id="1" name=""/>
-        <p:cNvGrpSpPr/>
-        <p:nvPr/>
-      </p:nvGrpSpPr>
-      <p:grpSpPr>
-        <a:xfrm>
-          <a:off x="0" y="0"/>
-          <a:ext cx="0" cy="0"/>
-          <a:chOff x="0" y="0"/>
-          <a:chExt cx="0" cy="0"/>
-        </a:xfrm>
-      </p:grpSpPr>
-      <p:sp>
-        <p:nvSpPr>
-          <p:cNvPr id="734210" name="Rectangle 2"/>
-          <p:cNvSpPr>
-            <a:spLocks noGrp="1" noChangeArrowheads="1"/>
-          </p:cNvSpPr>
-          <p:nvPr>
-            <p:ph type="title"/>
-          </p:nvPr>
-        </p:nvSpPr>
-        <p:spPr/>
-        <p:txBody>
-          <a:bodyPr/>
-          <a:lstStyle/>
-          <a:p>
-            <a:r>
-              <a:rPr lang="en-US" dirty="0"/>
-              <a:t>Lab Machine Environment</a:t>
-            </a:r>
-          </a:p>
-        </p:txBody>
-      </p:sp>
-      <p:sp>
-        <p:nvSpPr>
-          <p:cNvPr id="734211" name="Rectangle 3"/>
-          <p:cNvSpPr>
-            <a:spLocks noGrp="1" noChangeArrowheads="1"/>
-          </p:cNvSpPr>
-          <p:nvPr>
-            <p:ph idx="1"/>
-          </p:nvPr>
-        </p:nvSpPr>
-        <p:spPr/>
-        <p:txBody>
-          <a:bodyPr/>
-          <a:lstStyle/>
-          <a:p>
-            <a:r>
-              <a:rPr lang="en-US" dirty="0"/>
-              <a:t>Microsoft Windows Server 2016</a:t>
-            </a:r>
-          </a:p>
-          <a:p>
-            <a:r>
-              <a:rPr lang="en-US" dirty="0"/>
-              <a:t>Microsoft Visual Studio 2015</a:t>
-            </a:r>
-          </a:p>
-          <a:p>
-            <a:r>
-              <a:rPr lang="en-US" dirty="0"/>
-              <a:t>Microsoft SQL Server 2014</a:t>
-            </a:r>
-          </a:p>
-          <a:p>
-            <a:r>
-              <a:rPr lang="en-US" dirty="0"/>
-              <a:t>Microsoft BizTalk Server 2016</a:t>
-            </a:r>
-          </a:p>
-          <a:p>
-            <a:endParaRPr lang="en-US" dirty="0"/>
-          </a:p>
-          <a:p>
-            <a:r>
-              <a:rPr lang="en-US" dirty="0"/>
-              <a:t>Microsoft Office 2016</a:t>
-            </a:r>
-          </a:p>
-          <a:p>
-            <a:pPr lvl="1"/>
-            <a:endParaRPr lang="en-US" dirty="0"/>
-          </a:p>
-        </p:txBody>
-      </p:sp>
-    </p:spTree>
-    <p:extLst>
-      <p:ext uri="{BB962C8B-B14F-4D97-AF65-F5344CB8AC3E}">
-        <p14:creationId xmlns:p14="http://schemas.microsoft.com/office/powerpoint/2010/main" val="2586279579"/>
       </p:ext>
     </p:extLst>
   </p:cSld>

</xml_diff>

<commit_message>
Slide deck changes and correction in lab 8b
</commit_message>
<xml_diff>
--- a/Slides/Module 0 - Start.pptx
+++ b/Slides/Module 0 - Start.pptx
@@ -6,24 +6,25 @@
     <p:sldMasterId id="2147483902" r:id="rId3"/>
   </p:sldMasterIdLst>
   <p:notesMasterIdLst>
-    <p:notesMasterId r:id="rId16"/>
+    <p:notesMasterId r:id="rId17"/>
   </p:notesMasterIdLst>
   <p:handoutMasterIdLst>
-    <p:handoutMasterId r:id="rId17"/>
+    <p:handoutMasterId r:id="rId18"/>
   </p:handoutMasterIdLst>
   <p:sldIdLst>
     <p:sldId id="268" r:id="rId4"/>
     <p:sldId id="261" r:id="rId5"/>
     <p:sldId id="281" r:id="rId6"/>
-    <p:sldId id="291" r:id="rId7"/>
-    <p:sldId id="293" r:id="rId8"/>
-    <p:sldId id="285" r:id="rId9"/>
-    <p:sldId id="258" r:id="rId10"/>
-    <p:sldId id="262" r:id="rId11"/>
-    <p:sldId id="280" r:id="rId12"/>
-    <p:sldId id="288" r:id="rId13"/>
-    <p:sldId id="282" r:id="rId14"/>
-    <p:sldId id="292" r:id="rId15"/>
+    <p:sldId id="294" r:id="rId7"/>
+    <p:sldId id="291" r:id="rId8"/>
+    <p:sldId id="293" r:id="rId9"/>
+    <p:sldId id="285" r:id="rId10"/>
+    <p:sldId id="258" r:id="rId11"/>
+    <p:sldId id="262" r:id="rId12"/>
+    <p:sldId id="280" r:id="rId13"/>
+    <p:sldId id="288" r:id="rId14"/>
+    <p:sldId id="282" r:id="rId15"/>
+    <p:sldId id="292" r:id="rId16"/>
   </p:sldIdLst>
   <p:sldSz cx="9144000" cy="6858000" type="screen4x3"/>
   <p:notesSz cx="6858000" cy="9144000"/>
@@ -6872,7 +6873,7 @@
               <a:pPr>
                 <a:defRPr/>
               </a:pPr>
-              <a:t>07 October 2018</a:t>
+              <a:t>09 December 2018</a:t>
             </a:fld>
             <a:endParaRPr lang="de-DE"/>
           </a:p>
@@ -7183,7 +7184,7 @@
               <a:pPr>
                 <a:defRPr/>
               </a:pPr>
-              <a:t>7. Oktober 2018</a:t>
+              <a:t>9. Dezember 2018</a:t>
             </a:fld>
             <a:r>
               <a:rPr lang="de-DE"/>
@@ -7477,7 +7478,7 @@
               <a:pPr>
                 <a:defRPr/>
               </a:pPr>
-              <a:t>7. Oktober 2018</a:t>
+              <a:t>9. Dezember 2018</a:t>
             </a:fld>
             <a:r>
               <a:rPr lang="de-DE"/>
@@ -8291,7 +8292,7 @@
               <a:pPr>
                 <a:defRPr/>
               </a:pPr>
-              <a:t>7. Oktober 2018</a:t>
+              <a:t>9. Dezember 2018</a:t>
             </a:fld>
             <a:r>
               <a:rPr lang="de-DE"/>
@@ -8323,7 +8324,7 @@
               <a:pPr>
                 <a:defRPr/>
               </a:pPr>
-              <a:t>4</a:t>
+              <a:t>5</a:t>
             </a:fld>
             <a:endParaRPr lang="de-DE"/>
           </a:p>
@@ -8413,7 +8414,7 @@
               <a:pPr>
                 <a:defRPr/>
               </a:pPr>
-              <a:t>7. Oktober 2018</a:t>
+              <a:t>9. Dezember 2018</a:t>
             </a:fld>
             <a:r>
               <a:rPr lang="de-DE"/>
@@ -8445,7 +8446,7 @@
               <a:pPr>
                 <a:defRPr/>
               </a:pPr>
-              <a:t>6</a:t>
+              <a:t>7</a:t>
             </a:fld>
             <a:endParaRPr lang="de-DE"/>
           </a:p>
@@ -9033,7 +9034,7 @@
                   <a:schemeClr val="bg2"/>
                 </a:buClr>
               </a:pPr>
-              <a:t>8</a:t>
+              <a:t>9</a:t>
             </a:fld>
             <a:endParaRPr lang="en-US" sz="1200"/>
           </a:p>
@@ -9138,7 +9139,7 @@
             <a:fld id="{9DE7534A-5CC6-4C1E-8BEE-4B67478EA4F3}" type="slidenum">
               <a:rPr lang="en-US"/>
               <a:pPr/>
-              <a:t>11</a:t>
+              <a:t>12</a:t>
             </a:fld>
             <a:endParaRPr lang="en-US"/>
           </a:p>
@@ -9322,7 +9323,7 @@
           <a:p>
             <a:fld id="{243B3B10-B9A1-4966-B5AA-413205F2DE37}" type="datetimeFigureOut">
               <a:rPr lang="en-US" smtClean="0"/>
-              <a:t>10/7/2018</a:t>
+              <a:t>12/9/2018</a:t>
             </a:fld>
             <a:endParaRPr lang="en-US"/>
           </a:p>
@@ -9490,7 +9491,7 @@
           <a:p>
             <a:fld id="{243B3B10-B9A1-4966-B5AA-413205F2DE37}" type="datetimeFigureOut">
               <a:rPr lang="en-US" smtClean="0"/>
-              <a:t>10/7/2018</a:t>
+              <a:t>12/9/2018</a:t>
             </a:fld>
             <a:endParaRPr lang="en-US"/>
           </a:p>
@@ -9668,7 +9669,7 @@
           <a:p>
             <a:fld id="{243B3B10-B9A1-4966-B5AA-413205F2DE37}" type="datetimeFigureOut">
               <a:rPr lang="en-US" smtClean="0"/>
-              <a:t>10/7/2018</a:t>
+              <a:t>12/9/2018</a:t>
             </a:fld>
             <a:endParaRPr lang="en-US"/>
           </a:p>
@@ -11112,7 +11113,7 @@
           <a:p>
             <a:fld id="{243B3B10-B9A1-4966-B5AA-413205F2DE37}" type="datetimeFigureOut">
               <a:rPr lang="en-US" smtClean="0"/>
-              <a:t>10/7/2018</a:t>
+              <a:t>12/9/2018</a:t>
             </a:fld>
             <a:endParaRPr lang="en-US"/>
           </a:p>
@@ -12413,7 +12414,7 @@
           <a:p>
             <a:fld id="{243B3B10-B9A1-4966-B5AA-413205F2DE37}" type="datetimeFigureOut">
               <a:rPr lang="en-US" smtClean="0"/>
-              <a:t>10/7/2018</a:t>
+              <a:t>12/9/2018</a:t>
             </a:fld>
             <a:endParaRPr lang="en-US"/>
           </a:p>
@@ -12642,7 +12643,7 @@
           <a:p>
             <a:fld id="{243B3B10-B9A1-4966-B5AA-413205F2DE37}" type="datetimeFigureOut">
               <a:rPr lang="en-US" smtClean="0"/>
-              <a:t>10/7/2018</a:t>
+              <a:t>12/9/2018</a:t>
             </a:fld>
             <a:endParaRPr lang="en-US"/>
           </a:p>
@@ -13006,7 +13007,7 @@
           <a:p>
             <a:fld id="{243B3B10-B9A1-4966-B5AA-413205F2DE37}" type="datetimeFigureOut">
               <a:rPr lang="en-US" smtClean="0"/>
-              <a:t>10/7/2018</a:t>
+              <a:t>12/9/2018</a:t>
             </a:fld>
             <a:endParaRPr lang="en-US"/>
           </a:p>
@@ -13123,7 +13124,7 @@
           <a:p>
             <a:fld id="{243B3B10-B9A1-4966-B5AA-413205F2DE37}" type="datetimeFigureOut">
               <a:rPr lang="en-US" smtClean="0"/>
-              <a:t>10/7/2018</a:t>
+              <a:t>12/9/2018</a:t>
             </a:fld>
             <a:endParaRPr lang="en-US"/>
           </a:p>
@@ -13218,7 +13219,7 @@
           <a:p>
             <a:fld id="{243B3B10-B9A1-4966-B5AA-413205F2DE37}" type="datetimeFigureOut">
               <a:rPr lang="en-US" smtClean="0"/>
-              <a:t>10/7/2018</a:t>
+              <a:t>12/9/2018</a:t>
             </a:fld>
             <a:endParaRPr lang="en-US"/>
           </a:p>
@@ -13493,7 +13494,7 @@
           <a:p>
             <a:fld id="{243B3B10-B9A1-4966-B5AA-413205F2DE37}" type="datetimeFigureOut">
               <a:rPr lang="en-US" smtClean="0"/>
-              <a:t>10/7/2018</a:t>
+              <a:t>12/9/2018</a:t>
             </a:fld>
             <a:endParaRPr lang="en-US"/>
           </a:p>
@@ -13745,7 +13746,7 @@
           <a:p>
             <a:fld id="{243B3B10-B9A1-4966-B5AA-413205F2DE37}" type="datetimeFigureOut">
               <a:rPr lang="en-US" smtClean="0"/>
-              <a:t>10/7/2018</a:t>
+              <a:t>12/9/2018</a:t>
             </a:fld>
             <a:endParaRPr lang="en-US"/>
           </a:p>
@@ -13956,7 +13957,7 @@
           <a:p>
             <a:fld id="{243B3B10-B9A1-4966-B5AA-413205F2DE37}" type="datetimeFigureOut">
               <a:rPr lang="en-US" smtClean="0"/>
-              <a:t>10/7/2018</a:t>
+              <a:t>12/9/2018</a:t>
             </a:fld>
             <a:endParaRPr lang="en-US"/>
           </a:p>
@@ -15043,6 +15044,187 @@
       </p:grpSpPr>
       <p:sp>
         <p:nvSpPr>
+          <p:cNvPr id="2" name="Title 1"/>
+          <p:cNvSpPr>
+            <a:spLocks noGrp="1"/>
+          </p:cNvSpPr>
+          <p:nvPr>
+            <p:ph type="title"/>
+          </p:nvPr>
+        </p:nvSpPr>
+        <p:spPr/>
+        <p:txBody>
+          <a:bodyPr/>
+          <a:lstStyle/>
+          <a:p>
+            <a:r>
+              <a:rPr lang="sv-SE" dirty="0"/>
+              <a:t>Course material</a:t>
+            </a:r>
+          </a:p>
+        </p:txBody>
+      </p:sp>
+      <p:sp>
+        <p:nvSpPr>
+          <p:cNvPr id="3" name="Content Placeholder 2"/>
+          <p:cNvSpPr>
+            <a:spLocks noGrp="1"/>
+          </p:cNvSpPr>
+          <p:nvPr>
+            <p:ph idx="1"/>
+          </p:nvPr>
+        </p:nvSpPr>
+        <p:spPr/>
+        <p:txBody>
+          <a:bodyPr/>
+          <a:lstStyle/>
+          <a:p>
+            <a:r>
+              <a:rPr lang="sv-SE" dirty="0"/>
+              <a:t>Presentation </a:t>
+            </a:r>
+            <a:r>
+              <a:rPr lang="sv-SE" dirty="0" err="1"/>
+              <a:t>slide</a:t>
+            </a:r>
+            <a:r>
+              <a:rPr lang="sv-SE" dirty="0"/>
+              <a:t> </a:t>
+            </a:r>
+            <a:r>
+              <a:rPr lang="sv-SE" dirty="0" err="1"/>
+              <a:t>notes</a:t>
+            </a:r>
+            <a:r>
+              <a:rPr lang="sv-SE" dirty="0"/>
+              <a:t> &amp; demos</a:t>
+            </a:r>
+          </a:p>
+          <a:p>
+            <a:r>
+              <a:rPr lang="sv-SE" dirty="0"/>
+              <a:t>Course handout </a:t>
+            </a:r>
+            <a:r>
+              <a:rPr lang="sv-SE" dirty="0" err="1"/>
+              <a:t>compendium</a:t>
+            </a:r>
+            <a:endParaRPr lang="sv-SE" dirty="0"/>
+          </a:p>
+          <a:p>
+            <a:r>
+              <a:rPr lang="sv-SE" dirty="0"/>
+              <a:t>Lab </a:t>
+            </a:r>
+            <a:r>
+              <a:rPr lang="sv-SE" dirty="0" err="1"/>
+              <a:t>machine</a:t>
+            </a:r>
+            <a:r>
+              <a:rPr lang="sv-SE" dirty="0"/>
+              <a:t>/image</a:t>
+            </a:r>
+          </a:p>
+          <a:p>
+            <a:r>
+              <a:rPr lang="sv-SE" dirty="0"/>
+              <a:t>Git </a:t>
+            </a:r>
+            <a:r>
+              <a:rPr lang="sv-SE" dirty="0" err="1"/>
+              <a:t>repository</a:t>
+            </a:r>
+            <a:endParaRPr lang="sv-SE" dirty="0"/>
+          </a:p>
+          <a:p>
+            <a:pPr lvl="1"/>
+            <a:r>
+              <a:rPr lang="sv-SE" dirty="0"/>
+              <a:t>Hands-On-</a:t>
+            </a:r>
+            <a:r>
+              <a:rPr lang="sv-SE" dirty="0" err="1"/>
+              <a:t>Labs</a:t>
+            </a:r>
+            <a:endParaRPr lang="sv-SE" dirty="0"/>
+          </a:p>
+          <a:p>
+            <a:pPr lvl="1"/>
+            <a:r>
+              <a:rPr lang="sv-SE" dirty="0" err="1"/>
+              <a:t>Slides</a:t>
+            </a:r>
+            <a:endParaRPr lang="sv-SE" dirty="0"/>
+          </a:p>
+          <a:p>
+            <a:pPr lvl="1"/>
+            <a:r>
+              <a:rPr lang="sv-SE" dirty="0"/>
+              <a:t>Demos</a:t>
+            </a:r>
+          </a:p>
+          <a:p>
+            <a:r>
+              <a:rPr lang="sv-SE" dirty="0"/>
+              <a:t>Book: </a:t>
+            </a:r>
+            <a:r>
+              <a:rPr lang="sv-SE" dirty="0" err="1"/>
+              <a:t>Mapping</a:t>
+            </a:r>
+            <a:r>
+              <a:rPr lang="sv-SE" dirty="0"/>
+              <a:t> </a:t>
+            </a:r>
+            <a:r>
+              <a:rPr lang="sv-SE" dirty="0" err="1"/>
+              <a:t>patterns</a:t>
+            </a:r>
+            <a:endParaRPr lang="sv-SE" dirty="0"/>
+          </a:p>
+          <a:p>
+            <a:r>
+              <a:rPr lang="sv-SE" dirty="0"/>
+              <a:t>Course evaluation</a:t>
+            </a:r>
+          </a:p>
+          <a:p>
+            <a:endParaRPr lang="sv-SE" dirty="0"/>
+          </a:p>
+        </p:txBody>
+      </p:sp>
+    </p:spTree>
+    <p:extLst>
+      <p:ext uri="{BB962C8B-B14F-4D97-AF65-F5344CB8AC3E}">
+        <p14:creationId xmlns:p14="http://schemas.microsoft.com/office/powerpoint/2010/main" val="3888832975"/>
+      </p:ext>
+    </p:extLst>
+  </p:cSld>
+  <p:clrMapOvr>
+    <a:masterClrMapping/>
+  </p:clrMapOvr>
+</p:sld>
+</file>
+
+<file path=ppt/slides/slide11.xml><?xml version="1.0" encoding="utf-8"?>
+<p:sld xmlns:a="http://schemas.openxmlformats.org/drawingml/2006/main" xmlns:r="http://schemas.openxmlformats.org/officeDocument/2006/relationships" xmlns:p="http://schemas.openxmlformats.org/presentationml/2006/main">
+  <p:cSld>
+    <p:spTree>
+      <p:nvGrpSpPr>
+        <p:cNvPr id="1" name=""/>
+        <p:cNvGrpSpPr/>
+        <p:nvPr/>
+      </p:nvGrpSpPr>
+      <p:grpSpPr>
+        <a:xfrm>
+          <a:off x="0" y="0"/>
+          <a:ext cx="0" cy="0"/>
+          <a:chOff x="0" y="0"/>
+          <a:chExt cx="0" cy="0"/>
+        </a:xfrm>
+      </p:grpSpPr>
+      <p:sp>
+        <p:nvSpPr>
           <p:cNvPr id="734210" name="Rectangle 2"/>
           <p:cNvSpPr>
             <a:spLocks noGrp="1" noChangeArrowheads="1"/>
@@ -15129,7 +15311,7 @@
 </p:sld>
 </file>
 
-<file path=ppt/slides/slide11.xml><?xml version="1.0" encoding="utf-8"?>
+<file path=ppt/slides/slide12.xml><?xml version="1.0" encoding="utf-8"?>
 <p:sld xmlns:a="http://schemas.openxmlformats.org/drawingml/2006/main" xmlns:r="http://schemas.openxmlformats.org/officeDocument/2006/relationships" xmlns:p="http://schemas.openxmlformats.org/presentationml/2006/main">
   <p:cSld>
     <p:spTree>
@@ -15257,7 +15439,13 @@
           <a:p>
             <a:r>
               <a:rPr lang="en-US" dirty="0"/>
-              <a:t>Class hours – 8:45 – 17:00</a:t>
+              <a:t>Class hours: 9:00 – 17:00</a:t>
+            </a:r>
+          </a:p>
+          <a:p>
+            <a:r>
+              <a:rPr lang="en-US" dirty="0"/>
+              <a:t>Opening hours: 8:30 – 17:00 </a:t>
             </a:r>
           </a:p>
           <a:p>
@@ -15281,7 +15469,7 @@
           <a:p>
             <a:r>
               <a:rPr lang="en-US" dirty="0"/>
-              <a:t>Meals &amp; Breaks – ~ 10, 12, 15</a:t>
+              <a:t>Meals &amp; Breaks: ~ 10, 12, 15</a:t>
             </a:r>
           </a:p>
           <a:p>
@@ -15293,7 +15481,7 @@
           <a:p>
             <a:r>
               <a:rPr lang="en-US" dirty="0"/>
-              <a:t>Messages</a:t>
+              <a:t>Email</a:t>
             </a:r>
           </a:p>
           <a:p>
@@ -15329,7 +15517,7 @@
 </p:sld>
 </file>
 
-<file path=ppt/slides/slide12.xml><?xml version="1.0" encoding="utf-8"?>
+<file path=ppt/slides/slide13.xml><?xml version="1.0" encoding="utf-8"?>
 <p:sld xmlns:a="http://schemas.openxmlformats.org/drawingml/2006/main" xmlns:r="http://schemas.openxmlformats.org/officeDocument/2006/relationships" xmlns:p="http://schemas.openxmlformats.org/presentationml/2006/main">
   <p:cSld>
     <p:spTree>
@@ -16304,6 +16492,322 @@
 </file>
 
 <file path=ppt/slides/slide4.xml><?xml version="1.0" encoding="utf-8"?>
+<p:sld xmlns:a="http://schemas.openxmlformats.org/drawingml/2006/main" xmlns:r="http://schemas.openxmlformats.org/officeDocument/2006/relationships" xmlns:p="http://schemas.openxmlformats.org/presentationml/2006/main">
+  <p:cSld>
+    <p:spTree>
+      <p:nvGrpSpPr>
+        <p:cNvPr id="1" name=""/>
+        <p:cNvGrpSpPr/>
+        <p:nvPr/>
+      </p:nvGrpSpPr>
+      <p:grpSpPr>
+        <a:xfrm>
+          <a:off x="0" y="0"/>
+          <a:ext cx="0" cy="0"/>
+          <a:chOff x="0" y="0"/>
+          <a:chExt cx="0" cy="0"/>
+        </a:xfrm>
+      </p:grpSpPr>
+      <p:sp>
+        <p:nvSpPr>
+          <p:cNvPr id="2" name="Title 1"/>
+          <p:cNvSpPr>
+            <a:spLocks noGrp="1"/>
+          </p:cNvSpPr>
+          <p:nvPr>
+            <p:ph type="title"/>
+          </p:nvPr>
+        </p:nvSpPr>
+        <p:spPr/>
+        <p:txBody>
+          <a:bodyPr/>
+          <a:lstStyle/>
+          <a:p>
+            <a:r>
+              <a:rPr lang="sv-SE" dirty="0"/>
+              <a:t>Course layout</a:t>
+            </a:r>
+          </a:p>
+        </p:txBody>
+      </p:sp>
+      <p:cxnSp>
+        <p:nvCxnSpPr>
+          <p:cNvPr id="5" name="Straight Arrow Connector 4">
+            <a:extLst>
+              <a:ext uri="{FF2B5EF4-FFF2-40B4-BE49-F238E27FC236}">
+                <a16:creationId xmlns:a16="http://schemas.microsoft.com/office/drawing/2014/main" id="{19C91B3D-CE4F-438F-827D-F21DC20110DF}"/>
+              </a:ext>
+            </a:extLst>
+          </p:cNvPr>
+          <p:cNvCxnSpPr/>
+          <p:nvPr/>
+        </p:nvCxnSpPr>
+        <p:spPr bwMode="auto">
+          <a:xfrm flipV="1">
+            <a:off x="1907704" y="1772816"/>
+            <a:ext cx="0" cy="3816424"/>
+          </a:xfrm>
+          <a:prstGeom prst="straightConnector1">
+            <a:avLst/>
+          </a:prstGeom>
+          <a:ln>
+            <a:headEnd type="none" w="med" len="med"/>
+            <a:tailEnd type="triangle"/>
+          </a:ln>
+        </p:spPr>
+        <p:style>
+          <a:lnRef idx="3">
+            <a:schemeClr val="accent1"/>
+          </a:lnRef>
+          <a:fillRef idx="0">
+            <a:schemeClr val="accent1"/>
+          </a:fillRef>
+          <a:effectRef idx="2">
+            <a:schemeClr val="accent1"/>
+          </a:effectRef>
+          <a:fontRef idx="minor">
+            <a:schemeClr val="tx1"/>
+          </a:fontRef>
+        </p:style>
+      </p:cxnSp>
+      <p:cxnSp>
+        <p:nvCxnSpPr>
+          <p:cNvPr id="6" name="Straight Arrow Connector 5">
+            <a:extLst>
+              <a:ext uri="{FF2B5EF4-FFF2-40B4-BE49-F238E27FC236}">
+                <a16:creationId xmlns:a16="http://schemas.microsoft.com/office/drawing/2014/main" id="{5D37752F-DD2F-4004-ADDC-9982D5CE667D}"/>
+              </a:ext>
+            </a:extLst>
+          </p:cNvPr>
+          <p:cNvCxnSpPr>
+            <a:cxnSpLocks/>
+          </p:cNvCxnSpPr>
+          <p:nvPr/>
+        </p:nvCxnSpPr>
+        <p:spPr bwMode="auto">
+          <a:xfrm>
+            <a:off x="1907704" y="5589240"/>
+            <a:ext cx="5616624" cy="0"/>
+          </a:xfrm>
+          <a:prstGeom prst="straightConnector1">
+            <a:avLst/>
+          </a:prstGeom>
+          <a:ln>
+            <a:headEnd type="none" w="med" len="med"/>
+            <a:tailEnd type="triangle"/>
+          </a:ln>
+        </p:spPr>
+        <p:style>
+          <a:lnRef idx="3">
+            <a:schemeClr val="accent1"/>
+          </a:lnRef>
+          <a:fillRef idx="0">
+            <a:schemeClr val="accent1"/>
+          </a:fillRef>
+          <a:effectRef idx="2">
+            <a:schemeClr val="accent1"/>
+          </a:effectRef>
+          <a:fontRef idx="minor">
+            <a:schemeClr val="tx1"/>
+          </a:fontRef>
+        </p:style>
+      </p:cxnSp>
+      <p:sp>
+        <p:nvSpPr>
+          <p:cNvPr id="10" name="TextBox 9">
+            <a:extLst>
+              <a:ext uri="{FF2B5EF4-FFF2-40B4-BE49-F238E27FC236}">
+                <a16:creationId xmlns:a16="http://schemas.microsoft.com/office/drawing/2014/main" id="{BAD4E637-BF59-42DF-BEA3-51F06A9D53D5}"/>
+              </a:ext>
+            </a:extLst>
+          </p:cNvPr>
+          <p:cNvSpPr txBox="1"/>
+          <p:nvPr/>
+        </p:nvSpPr>
+        <p:spPr>
+          <a:xfrm>
+            <a:off x="467423" y="5301208"/>
+            <a:ext cx="1296392" cy="338554"/>
+          </a:xfrm>
+          <a:prstGeom prst="rect">
+            <a:avLst/>
+          </a:prstGeom>
+          <a:noFill/>
+        </p:spPr>
+        <p:txBody>
+          <a:bodyPr wrap="square" rtlCol="0">
+            <a:spAutoFit/>
+          </a:bodyPr>
+          <a:lstStyle/>
+          <a:p>
+            <a:r>
+              <a:rPr lang="en-US" dirty="0"/>
+              <a:t>More theory</a:t>
+            </a:r>
+          </a:p>
+        </p:txBody>
+      </p:sp>
+      <p:sp>
+        <p:nvSpPr>
+          <p:cNvPr id="11" name="TextBox 10">
+            <a:extLst>
+              <a:ext uri="{FF2B5EF4-FFF2-40B4-BE49-F238E27FC236}">
+                <a16:creationId xmlns:a16="http://schemas.microsoft.com/office/drawing/2014/main" id="{A92951FE-EA50-4A56-B26F-45B704E7211B}"/>
+              </a:ext>
+            </a:extLst>
+          </p:cNvPr>
+          <p:cNvSpPr txBox="1"/>
+          <p:nvPr/>
+        </p:nvSpPr>
+        <p:spPr>
+          <a:xfrm>
+            <a:off x="323535" y="1699663"/>
+            <a:ext cx="1584168" cy="338554"/>
+          </a:xfrm>
+          <a:prstGeom prst="rect">
+            <a:avLst/>
+          </a:prstGeom>
+          <a:noFill/>
+        </p:spPr>
+        <p:txBody>
+          <a:bodyPr wrap="square" rtlCol="0">
+            <a:spAutoFit/>
+          </a:bodyPr>
+          <a:lstStyle/>
+          <a:p>
+            <a:r>
+              <a:rPr lang="en-US" dirty="0"/>
+              <a:t>More hands-on</a:t>
+            </a:r>
+          </a:p>
+        </p:txBody>
+      </p:sp>
+      <p:sp>
+        <p:nvSpPr>
+          <p:cNvPr id="12" name="TextBox 11">
+            <a:extLst>
+              <a:ext uri="{FF2B5EF4-FFF2-40B4-BE49-F238E27FC236}">
+                <a16:creationId xmlns:a16="http://schemas.microsoft.com/office/drawing/2014/main" id="{677DB8A9-0ACA-4A9A-9628-B56772E39E8D}"/>
+              </a:ext>
+            </a:extLst>
+          </p:cNvPr>
+          <p:cNvSpPr txBox="1"/>
+          <p:nvPr/>
+        </p:nvSpPr>
+        <p:spPr>
+          <a:xfrm rot="19904912">
+            <a:off x="1469138" y="5895937"/>
+            <a:ext cx="1454689" cy="338554"/>
+          </a:xfrm>
+          <a:prstGeom prst="rect">
+            <a:avLst/>
+          </a:prstGeom>
+          <a:noFill/>
+        </p:spPr>
+        <p:txBody>
+          <a:bodyPr wrap="square" rtlCol="0">
+            <a:spAutoFit/>
+          </a:bodyPr>
+          <a:lstStyle/>
+          <a:p>
+            <a:r>
+              <a:rPr lang="en-US" dirty="0"/>
+              <a:t>Start of week</a:t>
+            </a:r>
+          </a:p>
+        </p:txBody>
+      </p:sp>
+      <p:sp>
+        <p:nvSpPr>
+          <p:cNvPr id="13" name="TextBox 12">
+            <a:extLst>
+              <a:ext uri="{FF2B5EF4-FFF2-40B4-BE49-F238E27FC236}">
+                <a16:creationId xmlns:a16="http://schemas.microsoft.com/office/drawing/2014/main" id="{19B1A0E3-C05A-40F1-98EE-78589164F8DE}"/>
+              </a:ext>
+            </a:extLst>
+          </p:cNvPr>
+          <p:cNvSpPr txBox="1"/>
+          <p:nvPr/>
+        </p:nvSpPr>
+        <p:spPr>
+          <a:xfrm rot="19904912">
+            <a:off x="5933636" y="5895936"/>
+            <a:ext cx="1454689" cy="338554"/>
+          </a:xfrm>
+          <a:prstGeom prst="rect">
+            <a:avLst/>
+          </a:prstGeom>
+          <a:noFill/>
+        </p:spPr>
+        <p:txBody>
+          <a:bodyPr wrap="square" rtlCol="0">
+            <a:spAutoFit/>
+          </a:bodyPr>
+          <a:lstStyle/>
+          <a:p>
+            <a:r>
+              <a:rPr lang="en-US" dirty="0"/>
+              <a:t>End of week</a:t>
+            </a:r>
+          </a:p>
+        </p:txBody>
+      </p:sp>
+      <p:cxnSp>
+        <p:nvCxnSpPr>
+          <p:cNvPr id="14" name="Straight Arrow Connector 13">
+            <a:extLst>
+              <a:ext uri="{FF2B5EF4-FFF2-40B4-BE49-F238E27FC236}">
+                <a16:creationId xmlns:a16="http://schemas.microsoft.com/office/drawing/2014/main" id="{F329EC84-F361-4678-AE93-A85622A363EB}"/>
+              </a:ext>
+            </a:extLst>
+          </p:cNvPr>
+          <p:cNvCxnSpPr>
+            <a:cxnSpLocks/>
+          </p:cNvCxnSpPr>
+          <p:nvPr/>
+        </p:nvCxnSpPr>
+        <p:spPr bwMode="auto">
+          <a:xfrm flipV="1">
+            <a:off x="2111165" y="2132856"/>
+            <a:ext cx="5053123" cy="3237878"/>
+          </a:xfrm>
+          <a:prstGeom prst="straightConnector1">
+            <a:avLst/>
+          </a:prstGeom>
+          <a:ln>
+            <a:headEnd type="none" w="med" len="med"/>
+            <a:tailEnd type="triangle"/>
+          </a:ln>
+        </p:spPr>
+        <p:style>
+          <a:lnRef idx="3">
+            <a:schemeClr val="accent6"/>
+          </a:lnRef>
+          <a:fillRef idx="0">
+            <a:schemeClr val="accent6"/>
+          </a:fillRef>
+          <a:effectRef idx="2">
+            <a:schemeClr val="accent6"/>
+          </a:effectRef>
+          <a:fontRef idx="minor">
+            <a:schemeClr val="tx1"/>
+          </a:fontRef>
+        </p:style>
+      </p:cxnSp>
+    </p:spTree>
+    <p:extLst>
+      <p:ext uri="{BB962C8B-B14F-4D97-AF65-F5344CB8AC3E}">
+        <p14:creationId xmlns:p14="http://schemas.microsoft.com/office/powerpoint/2010/main" val="2769685017"/>
+      </p:ext>
+    </p:extLst>
+  </p:cSld>
+  <p:clrMapOvr>
+    <a:masterClrMapping/>
+  </p:clrMapOvr>
+</p:sld>
+</file>
+
+<file path=ppt/slides/slide5.xml><?xml version="1.0" encoding="utf-8"?>
 <p:sld xmlns:a="http://schemas.openxmlformats.org/drawingml/2006/main" xmlns:r="http://schemas.openxmlformats.org/officeDocument/2006/relationships" xmlns:p="http://schemas.openxmlformats.org/presentationml/2006/main">
   <p:cSld>
     <p:spTree>
@@ -17224,7 +17728,7 @@
 </p:sld>
 </file>
 
-<file path=ppt/slides/slide5.xml><?xml version="1.0" encoding="utf-8"?>
+<file path=ppt/slides/slide6.xml><?xml version="1.0" encoding="utf-8"?>
 <p:sld xmlns:a="http://schemas.openxmlformats.org/drawingml/2006/main" xmlns:r="http://schemas.openxmlformats.org/officeDocument/2006/relationships" xmlns:p="http://schemas.openxmlformats.org/presentationml/2006/main">
   <p:cSld>
     <p:spTree>
@@ -17368,7 +17872,7 @@
 </p:sld>
 </file>
 
-<file path=ppt/slides/slide6.xml><?xml version="1.0" encoding="utf-8"?>
+<file path=ppt/slides/slide7.xml><?xml version="1.0" encoding="utf-8"?>
 <p:sld xmlns:a="http://schemas.openxmlformats.org/drawingml/2006/main" xmlns:r="http://schemas.openxmlformats.org/officeDocument/2006/relationships" xmlns:p="http://schemas.openxmlformats.org/presentationml/2006/main">
   <p:cSld>
     <p:spTree>
@@ -17484,7 +17988,7 @@
 </p:sld>
 </file>
 
-<file path=ppt/slides/slide7.xml><?xml version="1.0" encoding="utf-8"?>
+<file path=ppt/slides/slide8.xml><?xml version="1.0" encoding="utf-8"?>
 <p:sld xmlns:a="http://schemas.openxmlformats.org/drawingml/2006/main" xmlns:r="http://schemas.openxmlformats.org/officeDocument/2006/relationships" xmlns:p="http://schemas.openxmlformats.org/presentationml/2006/main">
   <p:cSld>
     <p:spTree>
@@ -17608,7 +18112,7 @@
 </p:sld>
 </file>
 
-<file path=ppt/slides/slide8.xml><?xml version="1.0" encoding="utf-8"?>
+<file path=ppt/slides/slide9.xml><?xml version="1.0" encoding="utf-8"?>
 <p:sld xmlns:a="http://schemas.openxmlformats.org/drawingml/2006/main" xmlns:r="http://schemas.openxmlformats.org/officeDocument/2006/relationships" xmlns:p="http://schemas.openxmlformats.org/presentationml/2006/main">
   <p:cSld>
     <p:spTree>
@@ -18910,155 +19414,143 @@
           </a:prstGeom>
         </p:spPr>
       </p:pic>
+      <p:sp>
+        <p:nvSpPr>
+          <p:cNvPr id="2" name="TextBox 1">
+            <a:extLst>
+              <a:ext uri="{FF2B5EF4-FFF2-40B4-BE49-F238E27FC236}">
+                <a16:creationId xmlns:a16="http://schemas.microsoft.com/office/drawing/2014/main" id="{0534A1EE-0454-4D4B-9D0A-DC4E3FD285F3}"/>
+              </a:ext>
+            </a:extLst>
+          </p:cNvPr>
+          <p:cNvSpPr txBox="1"/>
+          <p:nvPr/>
+        </p:nvSpPr>
+        <p:spPr>
+          <a:xfrm rot="2367766">
+            <a:off x="465621" y="3340885"/>
+            <a:ext cx="8424937" cy="523220"/>
+          </a:xfrm>
+          <a:prstGeom prst="rect">
+            <a:avLst/>
+          </a:prstGeom>
+          <a:noFill/>
+        </p:spPr>
+        <p:txBody>
+          <a:bodyPr wrap="square" rtlCol="0">
+            <a:spAutoFit/>
+          </a:bodyPr>
+          <a:lstStyle/>
+          <a:p>
+            <a:r>
+              <a:rPr lang="en-US" sz="2800" b="1" dirty="0">
+                <a:solidFill>
+                  <a:srgbClr val="C00000"/>
+                </a:solidFill>
+                <a:effectLst>
+                  <a:outerShdw blurRad="38100" dist="38100" dir="2700000" algn="tl">
+                    <a:srgbClr val="000000">
+                      <a:alpha val="43137"/>
+                    </a:srgbClr>
+                  </a:outerShdw>
+                </a:effectLst>
+              </a:rPr>
+              <a:t>NO CERTIFICATION AVAILABLE CURRENTLY</a:t>
+            </a:r>
+          </a:p>
+        </p:txBody>
+      </p:sp>
     </p:spTree>
   </p:cSld>
   <p:clrMapOvr>
     <a:masterClrMapping/>
   </p:clrMapOvr>
-</p:sld>
-</file>
-
-<file path=ppt/slides/slide9.xml><?xml version="1.0" encoding="utf-8"?>
-<p:sld xmlns:a="http://schemas.openxmlformats.org/drawingml/2006/main" xmlns:r="http://schemas.openxmlformats.org/officeDocument/2006/relationships" xmlns:p="http://schemas.openxmlformats.org/presentationml/2006/main">
-  <p:cSld>
-    <p:spTree>
-      <p:nvGrpSpPr>
-        <p:cNvPr id="1" name=""/>
-        <p:cNvGrpSpPr/>
-        <p:nvPr/>
-      </p:nvGrpSpPr>
-      <p:grpSpPr>
-        <a:xfrm>
-          <a:off x="0" y="0"/>
-          <a:ext cx="0" cy="0"/>
-          <a:chOff x="0" y="0"/>
-          <a:chExt cx="0" cy="0"/>
-        </a:xfrm>
-      </p:grpSpPr>
-      <p:sp>
-        <p:nvSpPr>
-          <p:cNvPr id="2" name="Title 1"/>
-          <p:cNvSpPr>
-            <a:spLocks noGrp="1"/>
-          </p:cNvSpPr>
-          <p:nvPr>
-            <p:ph type="title"/>
-          </p:nvPr>
-        </p:nvSpPr>
-        <p:spPr/>
-        <p:txBody>
-          <a:bodyPr/>
-          <a:lstStyle/>
-          <a:p>
-            <a:r>
-              <a:rPr lang="sv-SE" dirty="0"/>
-              <a:t>Course material</a:t>
-            </a:r>
-          </a:p>
-        </p:txBody>
-      </p:sp>
-      <p:sp>
-        <p:nvSpPr>
-          <p:cNvPr id="3" name="Content Placeholder 2"/>
-          <p:cNvSpPr>
-            <a:spLocks noGrp="1"/>
-          </p:cNvSpPr>
-          <p:nvPr>
-            <p:ph idx="1"/>
-          </p:nvPr>
-        </p:nvSpPr>
-        <p:spPr/>
-        <p:txBody>
-          <a:bodyPr/>
-          <a:lstStyle/>
-          <a:p>
-            <a:r>
-              <a:rPr lang="sv-SE" dirty="0"/>
-              <a:t>Presentation </a:t>
-            </a:r>
-            <a:r>
-              <a:rPr lang="sv-SE" dirty="0" err="1"/>
-              <a:t>slide</a:t>
-            </a:r>
-            <a:r>
-              <a:rPr lang="sv-SE" dirty="0"/>
-              <a:t> </a:t>
-            </a:r>
-            <a:r>
-              <a:rPr lang="sv-SE" dirty="0" err="1"/>
-              <a:t>notes</a:t>
-            </a:r>
-            <a:r>
-              <a:rPr lang="sv-SE" dirty="0"/>
-              <a:t> &amp; demos</a:t>
-            </a:r>
-          </a:p>
-          <a:p>
-            <a:r>
-              <a:rPr lang="sv-SE" dirty="0"/>
-              <a:t>Course handout </a:t>
-            </a:r>
-            <a:r>
-              <a:rPr lang="sv-SE" dirty="0" err="1"/>
-              <a:t>compendium</a:t>
-            </a:r>
-            <a:endParaRPr lang="sv-SE" dirty="0"/>
-          </a:p>
-          <a:p>
-            <a:r>
-              <a:rPr lang="sv-SE" dirty="0"/>
-              <a:t>Lab </a:t>
-            </a:r>
-            <a:r>
-              <a:rPr lang="sv-SE" dirty="0" err="1"/>
-              <a:t>machine</a:t>
-            </a:r>
-            <a:r>
-              <a:rPr lang="sv-SE" dirty="0"/>
-              <a:t>/image</a:t>
-            </a:r>
-          </a:p>
-          <a:p>
-            <a:r>
-              <a:rPr lang="sv-SE" dirty="0"/>
-              <a:t>Hands-On-Labs</a:t>
-            </a:r>
-          </a:p>
-          <a:p>
-            <a:r>
-              <a:rPr lang="sv-SE" dirty="0"/>
-              <a:t>Book: (MCTS) BizTalk Server 2010 (70-595) </a:t>
-            </a:r>
-            <a:r>
-              <a:rPr lang="sv-SE" dirty="0" err="1"/>
-              <a:t>Certification</a:t>
-            </a:r>
-            <a:r>
-              <a:rPr lang="sv-SE" dirty="0"/>
-              <a:t> Guide</a:t>
-            </a:r>
-          </a:p>
-          <a:p>
-            <a:r>
-              <a:rPr lang="sv-SE" dirty="0"/>
-              <a:t>Course evaluation</a:t>
-            </a:r>
-          </a:p>
-          <a:p>
-            <a:endParaRPr lang="sv-SE" dirty="0"/>
-          </a:p>
-        </p:txBody>
-      </p:sp>
-    </p:spTree>
-    <p:extLst>
-      <p:ext uri="{BB962C8B-B14F-4D97-AF65-F5344CB8AC3E}">
-        <p14:creationId xmlns:p14="http://schemas.microsoft.com/office/powerpoint/2010/main" val="3888832975"/>
-      </p:ext>
-    </p:extLst>
-  </p:cSld>
-  <p:clrMapOvr>
-    <a:masterClrMapping/>
-  </p:clrMapOvr>
+  <p:timing>
+    <p:tnLst>
+      <p:par>
+        <p:cTn id="1" dur="indefinite" restart="never" nodeType="tmRoot">
+          <p:childTnLst>
+            <p:seq concurrent="1" nextAc="seek">
+              <p:cTn id="2" dur="indefinite" nodeType="mainSeq">
+                <p:childTnLst>
+                  <p:par>
+                    <p:cTn id="3" fill="hold">
+                      <p:stCondLst>
+                        <p:cond delay="indefinite"/>
+                      </p:stCondLst>
+                      <p:childTnLst>
+                        <p:par>
+                          <p:cTn id="4" fill="hold">
+                            <p:stCondLst>
+                              <p:cond delay="0"/>
+                            </p:stCondLst>
+                            <p:childTnLst>
+                              <p:par>
+                                <p:cTn id="5" presetID="10" presetClass="entr" presetSubtype="0" fill="hold" grpId="0" nodeType="clickEffect">
+                                  <p:stCondLst>
+                                    <p:cond delay="0"/>
+                                  </p:stCondLst>
+                                  <p:childTnLst>
+                                    <p:set>
+                                      <p:cBhvr>
+                                        <p:cTn id="6" dur="1" fill="hold">
+                                          <p:stCondLst>
+                                            <p:cond delay="0"/>
+                                          </p:stCondLst>
+                                        </p:cTn>
+                                        <p:tgtEl>
+                                          <p:spTgt spid="2"/>
+                                        </p:tgtEl>
+                                        <p:attrNameLst>
+                                          <p:attrName>style.visibility</p:attrName>
+                                        </p:attrNameLst>
+                                      </p:cBhvr>
+                                      <p:to>
+                                        <p:strVal val="visible"/>
+                                      </p:to>
+                                    </p:set>
+                                    <p:animEffect transition="in" filter="fade">
+                                      <p:cBhvr>
+                                        <p:cTn id="7" dur="500"/>
+                                        <p:tgtEl>
+                                          <p:spTgt spid="2"/>
+                                        </p:tgtEl>
+                                      </p:cBhvr>
+                                    </p:animEffect>
+                                  </p:childTnLst>
+                                </p:cTn>
+                              </p:par>
+                            </p:childTnLst>
+                          </p:cTn>
+                        </p:par>
+                      </p:childTnLst>
+                    </p:cTn>
+                  </p:par>
+                </p:childTnLst>
+              </p:cTn>
+              <p:prevCondLst>
+                <p:cond evt="onPrev" delay="0">
+                  <p:tgtEl>
+                    <p:sldTgt/>
+                  </p:tgtEl>
+                </p:cond>
+              </p:prevCondLst>
+              <p:nextCondLst>
+                <p:cond evt="onNext" delay="0">
+                  <p:tgtEl>
+                    <p:sldTgt/>
+                  </p:tgtEl>
+                </p:cond>
+              </p:nextCondLst>
+            </p:seq>
+          </p:childTnLst>
+        </p:cTn>
+      </p:par>
+    </p:tnLst>
+    <p:bldLst>
+      <p:bldP spid="2" grpId="0"/>
+    </p:bldLst>
+  </p:timing>
 </p:sld>
 </file>
 

</xml_diff>